<commit_message>
Modified lab 1 for the new plutoCreateTxRx method.
</commit_message>
<xml_diff>
--- a/lab01_intro/intro.pptx
+++ b/lab01_intro/intro.pptx
@@ -4812,6 +4812,166 @@
           </a:p>
         </p:txBody>
       </p:sp>
+      <p:cxnSp>
+        <p:nvCxnSpPr>
+          <p:cNvPr id="17" name="Straight Arrow Connector 16">
+            <a:extLst>
+              <a:ext uri="{FF2B5EF4-FFF2-40B4-BE49-F238E27FC236}">
+                <a16:creationId xmlns:a16="http://schemas.microsoft.com/office/drawing/2014/main" id="{771CC1F4-D571-2530-8603-A8103DA5BE7F}"/>
+              </a:ext>
+            </a:extLst>
+          </p:cNvPr>
+          <p:cNvCxnSpPr/>
+          <p:nvPr/>
+        </p:nvCxnSpPr>
+        <p:spPr>
+          <a:xfrm>
+            <a:off x="7542027" y="2222557"/>
+            <a:ext cx="843517" cy="0"/>
+          </a:xfrm>
+          <a:prstGeom prst="straightConnector1">
+            <a:avLst/>
+          </a:prstGeom>
+          <a:ln w="31750">
+            <a:solidFill>
+              <a:schemeClr val="accent5">
+                <a:lumMod val="75000"/>
+              </a:schemeClr>
+            </a:solidFill>
+            <a:tailEnd type="triangle"/>
+          </a:ln>
+        </p:spPr>
+        <p:style>
+          <a:lnRef idx="1">
+            <a:schemeClr val="accent1"/>
+          </a:lnRef>
+          <a:fillRef idx="0">
+            <a:schemeClr val="accent1"/>
+          </a:fillRef>
+          <a:effectRef idx="0">
+            <a:schemeClr val="accent1"/>
+          </a:effectRef>
+          <a:fontRef idx="minor">
+            <a:schemeClr val="tx1"/>
+          </a:fontRef>
+        </p:style>
+      </p:cxnSp>
+      <p:cxnSp>
+        <p:nvCxnSpPr>
+          <p:cNvPr id="18" name="Straight Arrow Connector 17">
+            <a:extLst>
+              <a:ext uri="{FF2B5EF4-FFF2-40B4-BE49-F238E27FC236}">
+                <a16:creationId xmlns:a16="http://schemas.microsoft.com/office/drawing/2014/main" id="{49A2C948-94C9-7793-C22D-F77427663913}"/>
+              </a:ext>
+            </a:extLst>
+          </p:cNvPr>
+          <p:cNvCxnSpPr>
+            <a:cxnSpLocks/>
+          </p:cNvCxnSpPr>
+          <p:nvPr/>
+        </p:nvCxnSpPr>
+        <p:spPr>
+          <a:xfrm flipH="1">
+            <a:off x="7464244" y="4689805"/>
+            <a:ext cx="999082" cy="0"/>
+          </a:xfrm>
+          <a:prstGeom prst="straightConnector1">
+            <a:avLst/>
+          </a:prstGeom>
+          <a:ln w="31750">
+            <a:solidFill>
+              <a:schemeClr val="accent5">
+                <a:lumMod val="75000"/>
+              </a:schemeClr>
+            </a:solidFill>
+            <a:tailEnd type="triangle"/>
+          </a:ln>
+        </p:spPr>
+        <p:style>
+          <a:lnRef idx="1">
+            <a:schemeClr val="accent1"/>
+          </a:lnRef>
+          <a:fillRef idx="0">
+            <a:schemeClr val="accent1"/>
+          </a:fillRef>
+          <a:effectRef idx="0">
+            <a:schemeClr val="accent1"/>
+          </a:effectRef>
+          <a:fontRef idx="minor">
+            <a:schemeClr val="tx1"/>
+          </a:fontRef>
+        </p:style>
+      </p:cxnSp>
+      <p:sp>
+        <p:nvSpPr>
+          <p:cNvPr id="23" name="TextBox 22">
+            <a:extLst>
+              <a:ext uri="{FF2B5EF4-FFF2-40B4-BE49-F238E27FC236}">
+                <a16:creationId xmlns:a16="http://schemas.microsoft.com/office/drawing/2014/main" id="{19BE4AD5-5FB7-E221-FB53-F850D69A1D7F}"/>
+              </a:ext>
+            </a:extLst>
+          </p:cNvPr>
+          <p:cNvSpPr txBox="1"/>
+          <p:nvPr/>
+        </p:nvSpPr>
+        <p:spPr>
+          <a:xfrm>
+            <a:off x="8114475" y="4059965"/>
+            <a:ext cx="1058303" cy="369332"/>
+          </a:xfrm>
+          <a:prstGeom prst="rect">
+            <a:avLst/>
+          </a:prstGeom>
+          <a:noFill/>
+        </p:spPr>
+        <p:txBody>
+          <a:bodyPr wrap="none" rtlCol="0">
+            <a:spAutoFit/>
+          </a:bodyPr>
+          <a:lstStyle/>
+          <a:p>
+            <a:r>
+              <a:rPr lang="en-US" dirty="0"/>
+              <a:t>RX Buffer</a:t>
+            </a:r>
+          </a:p>
+        </p:txBody>
+      </p:sp>
+      <p:sp>
+        <p:nvSpPr>
+          <p:cNvPr id="24" name="TextBox 23">
+            <a:extLst>
+              <a:ext uri="{FF2B5EF4-FFF2-40B4-BE49-F238E27FC236}">
+                <a16:creationId xmlns:a16="http://schemas.microsoft.com/office/drawing/2014/main" id="{F19238A1-7D79-D282-E644-945573E79AB8}"/>
+              </a:ext>
+            </a:extLst>
+          </p:cNvPr>
+          <p:cNvSpPr txBox="1"/>
+          <p:nvPr/>
+        </p:nvSpPr>
+        <p:spPr>
+          <a:xfrm>
+            <a:off x="8188504" y="1644415"/>
+            <a:ext cx="1045479" cy="369332"/>
+          </a:xfrm>
+          <a:prstGeom prst="rect">
+            <a:avLst/>
+          </a:prstGeom>
+          <a:noFill/>
+        </p:spPr>
+        <p:txBody>
+          <a:bodyPr wrap="none" rtlCol="0">
+            <a:spAutoFit/>
+          </a:bodyPr>
+          <a:lstStyle/>
+          <a:p>
+            <a:r>
+              <a:rPr lang="en-US" dirty="0"/>
+              <a:t>TX Buffer</a:t>
+            </a:r>
+          </a:p>
+        </p:txBody>
+      </p:sp>
     </p:spTree>
     <p:extLst>
       <p:ext uri="{BB962C8B-B14F-4D97-AF65-F5344CB8AC3E}">
@@ -7476,13 +7636,13 @@
         </p:nvSpPr>
         <p:spPr>
           <a:xfrm>
-            <a:off x="2880781" y="1623223"/>
+            <a:off x="3925809" y="1643855"/>
             <a:ext cx="7673805" cy="4026210"/>
           </a:xfrm>
         </p:spPr>
         <p:txBody>
           <a:bodyPr>
-            <a:normAutofit lnSpcReduction="10000"/>
+            <a:normAutofit fontScale="92500" lnSpcReduction="10000"/>
           </a:bodyPr>
           <a:lstStyle/>
           <a:p>
@@ -7516,20 +7676,28 @@
             <a:pPr lvl="1"/>
             <a:r>
               <a:rPr lang="en-US" dirty="0"/>
-              <a:t>Power efficient, small form factor</a:t>
+              <a:t>Highly optimized</a:t>
             </a:r>
           </a:p>
           <a:p>
             <a:pPr lvl="1"/>
             <a:r>
-              <a:rPr lang="en-US" dirty="0"/>
-              <a:t>Highly optimized</a:t>
+              <a:rPr lang="en-US" dirty="0">
+                <a:solidFill>
+                  <a:srgbClr val="00B050"/>
+                </a:solidFill>
+              </a:rPr>
+              <a:t>Power efficient, small form factor, high performance</a:t>
             </a:r>
           </a:p>
           <a:p>
             <a:pPr lvl="1"/>
             <a:r>
-              <a:rPr lang="en-US" dirty="0"/>
+              <a:rPr lang="en-US" dirty="0">
+                <a:solidFill>
+                  <a:srgbClr val="FF0000"/>
+                </a:solidFill>
+              </a:rPr>
               <a:t>Limited programmability of communications functions</a:t>
             </a:r>
           </a:p>
@@ -7556,36 +7724,56 @@
           <a:p>
             <a:pPr lvl="1"/>
             <a:r>
-              <a:rPr lang="en-US" dirty="0"/>
+              <a:rPr lang="en-US" dirty="0">
+                <a:solidFill>
+                  <a:srgbClr val="FF0000"/>
+                </a:solidFill>
+              </a:rPr>
+              <a:t>Limited functionality / processing speed</a:t>
+            </a:r>
+          </a:p>
+          <a:p>
+            <a:pPr lvl="1"/>
+            <a:r>
+              <a:rPr lang="en-US" dirty="0">
+                <a:solidFill>
+                  <a:srgbClr val="FF0000"/>
+                </a:solidFill>
+              </a:rPr>
+              <a:t>Large form factor</a:t>
+            </a:r>
+          </a:p>
+          <a:p>
+            <a:pPr lvl="1"/>
+            <a:r>
+              <a:rPr lang="en-US" dirty="0">
+                <a:solidFill>
+                  <a:srgbClr val="FF0000"/>
+                </a:solidFill>
+              </a:rPr>
+              <a:t>Not (typically) for commercial use</a:t>
+            </a:r>
+          </a:p>
+          <a:p>
+            <a:pPr lvl="1"/>
+            <a:r>
+              <a:rPr lang="en-US" dirty="0">
+                <a:solidFill>
+                  <a:srgbClr val="00B050"/>
+                </a:solidFill>
+              </a:rPr>
               <a:t>Easy to change / program</a:t>
             </a:r>
           </a:p>
           <a:p>
             <a:pPr lvl="1"/>
             <a:r>
-              <a:rPr lang="en-US" dirty="0"/>
+              <a:rPr lang="en-US" dirty="0">
+                <a:solidFill>
+                  <a:srgbClr val="00B050"/>
+                </a:solidFill>
+              </a:rPr>
               <a:t>Excellent for learning, simple</a:t>
-            </a:r>
-          </a:p>
-          <a:p>
-            <a:pPr lvl="1"/>
-            <a:r>
-              <a:rPr lang="en-US" dirty="0"/>
-              <a:t>Limited functionality / processing speed</a:t>
-            </a:r>
-          </a:p>
-          <a:p>
-            <a:pPr lvl="1"/>
-            <a:r>
-              <a:rPr lang="en-US" dirty="0"/>
-              <a:t>Large form factor</a:t>
-            </a:r>
-          </a:p>
-          <a:p>
-            <a:pPr lvl="1"/>
-            <a:r>
-              <a:rPr lang="en-US" dirty="0"/>
-              <a:t>Not (typically) for commercial use</a:t>
             </a:r>
           </a:p>
         </p:txBody>
@@ -7650,6 +7838,53 @@
           <a:xfrm>
             <a:off x="669151" y="1559859"/>
             <a:ext cx="2097101" cy="2097101"/>
+          </a:xfrm>
+          <a:prstGeom prst="rect">
+            <a:avLst/>
+          </a:prstGeom>
+          <a:noFill/>
+          <a:extLst>
+            <a:ext uri="{909E8E84-426E-40DD-AFC4-6F175D3DCCD1}">
+              <a14:hiddenFill xmlns:a14="http://schemas.microsoft.com/office/drawing/2010/main">
+                <a:solidFill>
+                  <a:srgbClr val="FFFFFF"/>
+                </a:solidFill>
+              </a14:hiddenFill>
+            </a:ext>
+          </a:extLst>
+        </p:spPr>
+      </p:pic>
+      <p:pic>
+        <p:nvPicPr>
+          <p:cNvPr id="7172" name="Picture 4" descr="WiNRADiO WR-G315e with a Sony VAIO laptop">
+            <a:extLst>
+              <a:ext uri="{FF2B5EF4-FFF2-40B4-BE49-F238E27FC236}">
+                <a16:creationId xmlns:a16="http://schemas.microsoft.com/office/drawing/2014/main" id="{90272A68-E8DE-3D9C-7491-42D0047C02BC}"/>
+              </a:ext>
+            </a:extLst>
+          </p:cNvPr>
+          <p:cNvPicPr>
+            <a:picLocks noChangeAspect="1" noChangeArrowheads="1"/>
+          </p:cNvPicPr>
+          <p:nvPr/>
+        </p:nvPicPr>
+        <p:blipFill>
+          <a:blip r:embed="rId3">
+            <a:extLst>
+              <a:ext uri="{28A0092B-C50C-407E-A947-70E740481C1C}">
+                <a14:useLocalDpi xmlns:a14="http://schemas.microsoft.com/office/drawing/2010/main" val="0"/>
+              </a:ext>
+            </a:extLst>
+          </a:blip>
+          <a:srcRect/>
+          <a:stretch>
+            <a:fillRect/>
+          </a:stretch>
+        </p:blipFill>
+        <p:spPr bwMode="auto">
+          <a:xfrm>
+            <a:off x="1176217" y="3953369"/>
+            <a:ext cx="2411453" cy="1598449"/>
           </a:xfrm>
           <a:prstGeom prst="rect">
             <a:avLst/>

</xml_diff>

<commit_message>
Added slides for Lab 2
</commit_message>
<xml_diff>
--- a/lab01_intro/intro.pptx
+++ b/lab01_intro/intro.pptx
@@ -16,7 +16,7 @@
     <p:sldId id="432" r:id="rId7"/>
     <p:sldId id="433" r:id="rId8"/>
     <p:sldId id="428" r:id="rId9"/>
-    <p:sldId id="430" r:id="rId10"/>
+    <p:sldId id="441" r:id="rId10"/>
     <p:sldId id="429" r:id="rId11"/>
     <p:sldId id="427" r:id="rId12"/>
     <p:sldId id="431" r:id="rId13"/>
@@ -220,7 +220,7 @@
           <a:p>
             <a:fld id="{B7D6DDD3-D7E9-488B-B626-1E8285E424D8}" type="datetimeFigureOut">
               <a:rPr lang="en-US" smtClean="0"/>
-              <a:t>8/19/2022</a:t>
+              <a:t>8/26/2022</a:t>
             </a:fld>
             <a:endParaRPr lang="en-US"/>
           </a:p>
@@ -4088,298 +4088,12 @@
           <a:chExt cx="0" cy="0"/>
         </a:xfrm>
       </p:grpSpPr>
-      <p:sp>
-        <p:nvSpPr>
-          <p:cNvPr id="2" name="Title 1">
-            <a:extLst>
-              <a:ext uri="{FF2B5EF4-FFF2-40B4-BE49-F238E27FC236}">
-                <a16:creationId xmlns:a16="http://schemas.microsoft.com/office/drawing/2014/main" id="{E80FC24E-4519-7DFC-CF6B-0921B9784E30}"/>
-              </a:ext>
-            </a:extLst>
-          </p:cNvPr>
-          <p:cNvSpPr>
-            <a:spLocks noGrp="1"/>
-          </p:cNvSpPr>
-          <p:nvPr>
-            <p:ph type="title"/>
-          </p:nvPr>
-        </p:nvSpPr>
-        <p:spPr/>
-        <p:txBody>
-          <a:bodyPr/>
-          <a:lstStyle/>
-          <a:p>
-            <a:r>
-              <a:rPr lang="en-US" dirty="0"/>
-              <a:t>Non-Real Time Processing</a:t>
-            </a:r>
-          </a:p>
-        </p:txBody>
-      </p:sp>
-      <p:sp>
-        <p:nvSpPr>
-          <p:cNvPr id="3" name="Content Placeholder 2">
-            <a:extLst>
-              <a:ext uri="{FF2B5EF4-FFF2-40B4-BE49-F238E27FC236}">
-                <a16:creationId xmlns:a16="http://schemas.microsoft.com/office/drawing/2014/main" id="{8F658DFB-D297-F889-C91F-CAA723084A78}"/>
-              </a:ext>
-            </a:extLst>
-          </p:cNvPr>
-          <p:cNvSpPr>
-            <a:spLocks noGrp="1"/>
-          </p:cNvSpPr>
-          <p:nvPr>
-            <p:ph idx="1"/>
-          </p:nvPr>
-        </p:nvSpPr>
-        <p:spPr/>
-        <p:txBody>
-          <a:bodyPr>
-            <a:normAutofit lnSpcReduction="10000"/>
-          </a:bodyPr>
-          <a:lstStyle/>
-          <a:p>
-            <a:r>
-              <a:rPr lang="en-US" dirty="0"/>
-              <a:t>This class:  </a:t>
-            </a:r>
-            <a:r>
-              <a:rPr lang="en-US" dirty="0">
-                <a:solidFill>
-                  <a:schemeClr val="accent1">
-                    <a:lumMod val="60000"/>
-                    <a:lumOff val="40000"/>
-                  </a:schemeClr>
-                </a:solidFill>
-              </a:rPr>
-              <a:t>non-real time </a:t>
-            </a:r>
-            <a:r>
-              <a:rPr lang="en-US" dirty="0"/>
-              <a:t>experiments</a:t>
-            </a:r>
-          </a:p>
-          <a:p>
-            <a:pPr lvl="1"/>
-            <a:r>
-              <a:rPr lang="en-US" dirty="0"/>
-              <a:t>Simple and channel is realistic</a:t>
-            </a:r>
-          </a:p>
-          <a:p>
-            <a:pPr lvl="1"/>
-            <a:r>
-              <a:rPr lang="en-US" dirty="0"/>
-              <a:t>But one-way, limited duration</a:t>
-            </a:r>
-            <a:br>
-              <a:rPr lang="en-US" dirty="0"/>
-            </a:br>
-            <a:endParaRPr lang="en-US" dirty="0"/>
-          </a:p>
-          <a:p>
-            <a:r>
-              <a:rPr lang="en-US" dirty="0">
-                <a:solidFill>
-                  <a:schemeClr val="accent1">
-                    <a:lumMod val="60000"/>
-                    <a:lumOff val="40000"/>
-                  </a:schemeClr>
-                </a:solidFill>
-              </a:rPr>
-              <a:t>Transmitter (TX) </a:t>
-            </a:r>
-          </a:p>
-          <a:p>
-            <a:pPr lvl="1"/>
-            <a:r>
-              <a:rPr lang="en-US" dirty="0"/>
-              <a:t>Load </a:t>
-            </a:r>
-            <a:r>
-              <a:rPr lang="en-US" dirty="0">
-                <a:solidFill>
-                  <a:schemeClr val="accent1">
-                    <a:lumMod val="60000"/>
-                    <a:lumOff val="40000"/>
-                  </a:schemeClr>
-                </a:solidFill>
-              </a:rPr>
-              <a:t>circular buffer </a:t>
-            </a:r>
-            <a:r>
-              <a:rPr lang="en-US" dirty="0"/>
-              <a:t>once</a:t>
-            </a:r>
-          </a:p>
-          <a:p>
-            <a:pPr lvl="1"/>
-            <a:r>
-              <a:rPr lang="en-US" dirty="0"/>
-              <a:t>TX repeatedly sends same samples</a:t>
-            </a:r>
-            <a:br>
-              <a:rPr lang="en-US" dirty="0"/>
-            </a:br>
-            <a:r>
-              <a:rPr lang="en-US" dirty="0"/>
-              <a:t>over and over again</a:t>
-            </a:r>
-          </a:p>
-          <a:p>
-            <a:pPr lvl="1"/>
-            <a:endParaRPr lang="en-US" dirty="0"/>
-          </a:p>
-          <a:p>
-            <a:pPr lvl="1"/>
-            <a:endParaRPr lang="en-US" dirty="0"/>
-          </a:p>
-          <a:p>
-            <a:r>
-              <a:rPr lang="en-US" dirty="0">
-                <a:solidFill>
-                  <a:schemeClr val="accent1">
-                    <a:lumMod val="60000"/>
-                    <a:lumOff val="40000"/>
-                  </a:schemeClr>
-                </a:solidFill>
-              </a:rPr>
-              <a:t>Receiver (RX)</a:t>
-            </a:r>
-          </a:p>
-          <a:p>
-            <a:pPr lvl="1"/>
-            <a:r>
-              <a:rPr lang="en-US" dirty="0"/>
-              <a:t>Capture one </a:t>
-            </a:r>
-            <a:r>
-              <a:rPr lang="en-US" dirty="0">
-                <a:solidFill>
-                  <a:schemeClr val="accent1">
-                    <a:lumMod val="60000"/>
-                    <a:lumOff val="40000"/>
-                  </a:schemeClr>
-                </a:solidFill>
-              </a:rPr>
-              <a:t>frame</a:t>
-            </a:r>
-            <a:r>
-              <a:rPr lang="en-US" dirty="0"/>
-              <a:t> of samples</a:t>
-            </a:r>
-          </a:p>
-          <a:p>
-            <a:pPr lvl="1"/>
-            <a:r>
-              <a:rPr lang="en-US" dirty="0"/>
-              <a:t>Load IQ samples into computer</a:t>
-            </a:r>
-          </a:p>
-          <a:p>
-            <a:pPr lvl="1"/>
-            <a:r>
-              <a:rPr lang="en-US" dirty="0"/>
-              <a:t>Process offline</a:t>
-            </a:r>
-          </a:p>
-          <a:p>
-            <a:pPr lvl="1"/>
-            <a:endParaRPr lang="en-US" dirty="0"/>
-          </a:p>
-          <a:p>
-            <a:pPr lvl="1"/>
-            <a:endParaRPr lang="en-US" dirty="0"/>
-          </a:p>
-        </p:txBody>
-      </p:sp>
-      <p:sp>
-        <p:nvSpPr>
-          <p:cNvPr id="4" name="Slide Number Placeholder 3">
-            <a:extLst>
-              <a:ext uri="{FF2B5EF4-FFF2-40B4-BE49-F238E27FC236}">
-                <a16:creationId xmlns:a16="http://schemas.microsoft.com/office/drawing/2014/main" id="{35AD8531-CA2F-4BF3-80A0-8A925337A3A0}"/>
-              </a:ext>
-            </a:extLst>
-          </p:cNvPr>
-          <p:cNvSpPr>
-            <a:spLocks noGrp="1"/>
-          </p:cNvSpPr>
-          <p:nvPr>
-            <p:ph type="sldNum" sz="quarter" idx="12"/>
-          </p:nvPr>
-        </p:nvSpPr>
-        <p:spPr/>
-        <p:txBody>
-          <a:bodyPr/>
-          <a:lstStyle/>
-          <a:p>
-            <a:fld id="{629637A9-119A-49DA-BD12-AAC58B377D80}" type="slidenum">
-              <a:rPr lang="en-US" smtClean="0"/>
-              <a:t>10</a:t>
-            </a:fld>
-            <a:endParaRPr lang="en-US" dirty="0"/>
-          </a:p>
-        </p:txBody>
-      </p:sp>
-      <p:sp>
-        <p:nvSpPr>
-          <p:cNvPr id="5" name="Rectangle 4">
-            <a:extLst>
-              <a:ext uri="{FF2B5EF4-FFF2-40B4-BE49-F238E27FC236}">
-                <a16:creationId xmlns:a16="http://schemas.microsoft.com/office/drawing/2014/main" id="{4E9B192F-DBD5-24AB-3E33-584F4716F97E}"/>
-              </a:ext>
-            </a:extLst>
-          </p:cNvPr>
-          <p:cNvSpPr/>
-          <p:nvPr/>
-        </p:nvSpPr>
-        <p:spPr>
-          <a:xfrm>
-            <a:off x="8111224" y="1980002"/>
-            <a:ext cx="1169413" cy="407271"/>
-          </a:xfrm>
-          <a:prstGeom prst="rect">
-            <a:avLst/>
-          </a:prstGeom>
-          <a:solidFill>
-            <a:schemeClr val="accent2">
-              <a:lumMod val="40000"/>
-              <a:lumOff val="60000"/>
-            </a:schemeClr>
-          </a:solidFill>
-        </p:spPr>
-        <p:style>
-          <a:lnRef idx="2">
-            <a:schemeClr val="accent1">
-              <a:shade val="50000"/>
-            </a:schemeClr>
-          </a:lnRef>
-          <a:fillRef idx="1">
-            <a:schemeClr val="accent1"/>
-          </a:fillRef>
-          <a:effectRef idx="0">
-            <a:schemeClr val="accent1"/>
-          </a:effectRef>
-          <a:fontRef idx="minor">
-            <a:schemeClr val="lt1"/>
-          </a:fontRef>
-        </p:style>
-        <p:txBody>
-          <a:bodyPr rtlCol="0" anchor="ctr"/>
-          <a:lstStyle/>
-          <a:p>
-            <a:pPr algn="ctr"/>
-            <a:endParaRPr lang="en-US"/>
-          </a:p>
-        </p:txBody>
-      </p:sp>
       <p:pic>
         <p:nvPicPr>
-          <p:cNvPr id="10242" name="Picture 2" descr="Circular Arrow Vector SVG Icon - SVG Repo">
-            <a:extLst>
-              <a:ext uri="{FF2B5EF4-FFF2-40B4-BE49-F238E27FC236}">
-                <a16:creationId xmlns:a16="http://schemas.microsoft.com/office/drawing/2014/main" id="{051315BA-1409-C30D-8AA4-7F90AC03237E}"/>
+          <p:cNvPr id="10244" name="Picture 4" descr="Analog Devices ADALM-PLUTO Enlarged Image">
+            <a:extLst>
+              <a:ext uri="{FF2B5EF4-FFF2-40B4-BE49-F238E27FC236}">
+                <a16:creationId xmlns:a16="http://schemas.microsoft.com/office/drawing/2014/main" id="{B0D65CC4-D5F8-18EB-D77D-41A6E9103EC8}"/>
               </a:ext>
             </a:extLst>
           </p:cNvPr>
@@ -4402,9 +4116,9 @@
           </a:stretch>
         </p:blipFill>
         <p:spPr bwMode="auto">
-          <a:xfrm>
-            <a:off x="9440646" y="1655487"/>
-            <a:ext cx="963446" cy="921298"/>
+          <a:xfrm rot="10800000">
+            <a:off x="10246087" y="1563931"/>
+            <a:ext cx="1357140" cy="1348093"/>
           </a:xfrm>
           <a:prstGeom prst="rect">
             <a:avLst/>
@@ -4421,12 +4135,298 @@
           </a:extLst>
         </p:spPr>
       </p:pic>
+      <p:sp>
+        <p:nvSpPr>
+          <p:cNvPr id="2" name="Title 1">
+            <a:extLst>
+              <a:ext uri="{FF2B5EF4-FFF2-40B4-BE49-F238E27FC236}">
+                <a16:creationId xmlns:a16="http://schemas.microsoft.com/office/drawing/2014/main" id="{E80FC24E-4519-7DFC-CF6B-0921B9784E30}"/>
+              </a:ext>
+            </a:extLst>
+          </p:cNvPr>
+          <p:cNvSpPr>
+            <a:spLocks noGrp="1"/>
+          </p:cNvSpPr>
+          <p:nvPr>
+            <p:ph type="title"/>
+          </p:nvPr>
+        </p:nvSpPr>
+        <p:spPr/>
+        <p:txBody>
+          <a:bodyPr/>
+          <a:lstStyle/>
+          <a:p>
+            <a:r>
+              <a:rPr lang="en-US" dirty="0"/>
+              <a:t>Non-Real Time Processing</a:t>
+            </a:r>
+          </a:p>
+        </p:txBody>
+      </p:sp>
+      <p:sp>
+        <p:nvSpPr>
+          <p:cNvPr id="3" name="Content Placeholder 2">
+            <a:extLst>
+              <a:ext uri="{FF2B5EF4-FFF2-40B4-BE49-F238E27FC236}">
+                <a16:creationId xmlns:a16="http://schemas.microsoft.com/office/drawing/2014/main" id="{8F658DFB-D297-F889-C91F-CAA723084A78}"/>
+              </a:ext>
+            </a:extLst>
+          </p:cNvPr>
+          <p:cNvSpPr>
+            <a:spLocks noGrp="1"/>
+          </p:cNvSpPr>
+          <p:nvPr>
+            <p:ph idx="1"/>
+          </p:nvPr>
+        </p:nvSpPr>
+        <p:spPr/>
+        <p:txBody>
+          <a:bodyPr>
+            <a:normAutofit lnSpcReduction="10000"/>
+          </a:bodyPr>
+          <a:lstStyle/>
+          <a:p>
+            <a:r>
+              <a:rPr lang="en-US" dirty="0"/>
+              <a:t>This class:  </a:t>
+            </a:r>
+            <a:r>
+              <a:rPr lang="en-US" dirty="0">
+                <a:solidFill>
+                  <a:schemeClr val="accent1">
+                    <a:lumMod val="60000"/>
+                    <a:lumOff val="40000"/>
+                  </a:schemeClr>
+                </a:solidFill>
+              </a:rPr>
+              <a:t>non-real time </a:t>
+            </a:r>
+            <a:r>
+              <a:rPr lang="en-US" dirty="0"/>
+              <a:t>experiments</a:t>
+            </a:r>
+          </a:p>
+          <a:p>
+            <a:pPr lvl="1"/>
+            <a:r>
+              <a:rPr lang="en-US" dirty="0"/>
+              <a:t>Simple and channel is realistic</a:t>
+            </a:r>
+          </a:p>
+          <a:p>
+            <a:pPr lvl="1"/>
+            <a:r>
+              <a:rPr lang="en-US" dirty="0"/>
+              <a:t>But one-way, limited duration</a:t>
+            </a:r>
+            <a:br>
+              <a:rPr lang="en-US" dirty="0"/>
+            </a:br>
+            <a:endParaRPr lang="en-US" dirty="0"/>
+          </a:p>
+          <a:p>
+            <a:r>
+              <a:rPr lang="en-US" dirty="0">
+                <a:solidFill>
+                  <a:schemeClr val="accent1">
+                    <a:lumMod val="60000"/>
+                    <a:lumOff val="40000"/>
+                  </a:schemeClr>
+                </a:solidFill>
+              </a:rPr>
+              <a:t>Transmitter (TX) </a:t>
+            </a:r>
+          </a:p>
+          <a:p>
+            <a:pPr lvl="1"/>
+            <a:r>
+              <a:rPr lang="en-US" dirty="0"/>
+              <a:t>Load </a:t>
+            </a:r>
+            <a:r>
+              <a:rPr lang="en-US" dirty="0">
+                <a:solidFill>
+                  <a:schemeClr val="accent1">
+                    <a:lumMod val="60000"/>
+                    <a:lumOff val="40000"/>
+                  </a:schemeClr>
+                </a:solidFill>
+              </a:rPr>
+              <a:t>circular buffer </a:t>
+            </a:r>
+            <a:r>
+              <a:rPr lang="en-US" dirty="0"/>
+              <a:t>once</a:t>
+            </a:r>
+          </a:p>
+          <a:p>
+            <a:pPr lvl="1"/>
+            <a:r>
+              <a:rPr lang="en-US" dirty="0"/>
+              <a:t>TX repeatedly sends same samples</a:t>
+            </a:r>
+            <a:br>
+              <a:rPr lang="en-US" dirty="0"/>
+            </a:br>
+            <a:r>
+              <a:rPr lang="en-US" dirty="0"/>
+              <a:t>over and over again</a:t>
+            </a:r>
+          </a:p>
+          <a:p>
+            <a:pPr lvl="1"/>
+            <a:endParaRPr lang="en-US" dirty="0"/>
+          </a:p>
+          <a:p>
+            <a:pPr lvl="1"/>
+            <a:endParaRPr lang="en-US" dirty="0"/>
+          </a:p>
+          <a:p>
+            <a:r>
+              <a:rPr lang="en-US" dirty="0">
+                <a:solidFill>
+                  <a:schemeClr val="accent1">
+                    <a:lumMod val="60000"/>
+                    <a:lumOff val="40000"/>
+                  </a:schemeClr>
+                </a:solidFill>
+              </a:rPr>
+              <a:t>Receiver (RX)</a:t>
+            </a:r>
+          </a:p>
+          <a:p>
+            <a:pPr lvl="1"/>
+            <a:r>
+              <a:rPr lang="en-US" dirty="0"/>
+              <a:t>Capture one </a:t>
+            </a:r>
+            <a:r>
+              <a:rPr lang="en-US" dirty="0">
+                <a:solidFill>
+                  <a:schemeClr val="accent1">
+                    <a:lumMod val="60000"/>
+                    <a:lumOff val="40000"/>
+                  </a:schemeClr>
+                </a:solidFill>
+              </a:rPr>
+              <a:t>frame</a:t>
+            </a:r>
+            <a:r>
+              <a:rPr lang="en-US" dirty="0"/>
+              <a:t> of samples</a:t>
+            </a:r>
+          </a:p>
+          <a:p>
+            <a:pPr lvl="1"/>
+            <a:r>
+              <a:rPr lang="en-US" dirty="0"/>
+              <a:t>Load IQ samples into computer</a:t>
+            </a:r>
+          </a:p>
+          <a:p>
+            <a:pPr lvl="1"/>
+            <a:r>
+              <a:rPr lang="en-US" dirty="0"/>
+              <a:t>Process offline</a:t>
+            </a:r>
+          </a:p>
+          <a:p>
+            <a:pPr lvl="1"/>
+            <a:endParaRPr lang="en-US" dirty="0"/>
+          </a:p>
+          <a:p>
+            <a:pPr lvl="1"/>
+            <a:endParaRPr lang="en-US" dirty="0"/>
+          </a:p>
+        </p:txBody>
+      </p:sp>
+      <p:sp>
+        <p:nvSpPr>
+          <p:cNvPr id="4" name="Slide Number Placeholder 3">
+            <a:extLst>
+              <a:ext uri="{FF2B5EF4-FFF2-40B4-BE49-F238E27FC236}">
+                <a16:creationId xmlns:a16="http://schemas.microsoft.com/office/drawing/2014/main" id="{35AD8531-CA2F-4BF3-80A0-8A925337A3A0}"/>
+              </a:ext>
+            </a:extLst>
+          </p:cNvPr>
+          <p:cNvSpPr>
+            <a:spLocks noGrp="1"/>
+          </p:cNvSpPr>
+          <p:nvPr>
+            <p:ph type="sldNum" sz="quarter" idx="12"/>
+          </p:nvPr>
+        </p:nvSpPr>
+        <p:spPr/>
+        <p:txBody>
+          <a:bodyPr/>
+          <a:lstStyle/>
+          <a:p>
+            <a:fld id="{629637A9-119A-49DA-BD12-AAC58B377D80}" type="slidenum">
+              <a:rPr lang="en-US" smtClean="0"/>
+              <a:t>10</a:t>
+            </a:fld>
+            <a:endParaRPr lang="en-US" dirty="0"/>
+          </a:p>
+        </p:txBody>
+      </p:sp>
+      <p:sp>
+        <p:nvSpPr>
+          <p:cNvPr id="5" name="Rectangle 4">
+            <a:extLst>
+              <a:ext uri="{FF2B5EF4-FFF2-40B4-BE49-F238E27FC236}">
+                <a16:creationId xmlns:a16="http://schemas.microsoft.com/office/drawing/2014/main" id="{4E9B192F-DBD5-24AB-3E33-584F4716F97E}"/>
+              </a:ext>
+            </a:extLst>
+          </p:cNvPr>
+          <p:cNvSpPr/>
+          <p:nvPr/>
+        </p:nvSpPr>
+        <p:spPr>
+          <a:xfrm>
+            <a:off x="8111224" y="1980002"/>
+            <a:ext cx="1169413" cy="407271"/>
+          </a:xfrm>
+          <a:prstGeom prst="rect">
+            <a:avLst/>
+          </a:prstGeom>
+          <a:solidFill>
+            <a:schemeClr val="accent2">
+              <a:lumMod val="40000"/>
+              <a:lumOff val="60000"/>
+            </a:schemeClr>
+          </a:solidFill>
+        </p:spPr>
+        <p:style>
+          <a:lnRef idx="2">
+            <a:schemeClr val="accent1">
+              <a:shade val="50000"/>
+            </a:schemeClr>
+          </a:lnRef>
+          <a:fillRef idx="1">
+            <a:schemeClr val="accent1"/>
+          </a:fillRef>
+          <a:effectRef idx="0">
+            <a:schemeClr val="accent1"/>
+          </a:effectRef>
+          <a:fontRef idx="minor">
+            <a:schemeClr val="lt1"/>
+          </a:fontRef>
+        </p:style>
+        <p:txBody>
+          <a:bodyPr rtlCol="0" anchor="ctr"/>
+          <a:lstStyle/>
+          <a:p>
+            <a:pPr algn="ctr"/>
+            <a:endParaRPr lang="en-US"/>
+          </a:p>
+        </p:txBody>
+      </p:sp>
       <p:pic>
         <p:nvPicPr>
-          <p:cNvPr id="10244" name="Picture 4" descr="Analog Devices ADALM-PLUTO Enlarged Image">
-            <a:extLst>
-              <a:ext uri="{FF2B5EF4-FFF2-40B4-BE49-F238E27FC236}">
-                <a16:creationId xmlns:a16="http://schemas.microsoft.com/office/drawing/2014/main" id="{B0D65CC4-D5F8-18EB-D77D-41A6E9103EC8}"/>
+          <p:cNvPr id="10242" name="Picture 2" descr="Circular Arrow Vector SVG Icon - SVG Repo">
+            <a:extLst>
+              <a:ext uri="{FF2B5EF4-FFF2-40B4-BE49-F238E27FC236}">
+                <a16:creationId xmlns:a16="http://schemas.microsoft.com/office/drawing/2014/main" id="{051315BA-1409-C30D-8AA4-7F90AC03237E}"/>
               </a:ext>
             </a:extLst>
           </p:cNvPr>
@@ -4449,9 +4449,9 @@
           </a:stretch>
         </p:blipFill>
         <p:spPr bwMode="auto">
-          <a:xfrm rot="10800000">
-            <a:off x="10438786" y="1576213"/>
-            <a:ext cx="1357140" cy="1348093"/>
+          <a:xfrm>
+            <a:off x="9440646" y="1655487"/>
+            <a:ext cx="963446" cy="921298"/>
           </a:xfrm>
           <a:prstGeom prst="rect">
             <a:avLst/>
@@ -4483,7 +4483,7 @@
           <p:nvPr/>
         </p:nvPicPr>
         <p:blipFill>
-          <a:blip r:embed="rId3">
+          <a:blip r:embed="rId2">
             <a:extLst>
               <a:ext uri="{28A0092B-C50C-407E-A947-70E740481C1C}">
                 <a14:useLocalDpi xmlns:a14="http://schemas.microsoft.com/office/drawing/2010/main" val="0"/>
@@ -4710,10 +4710,10 @@
       </p:sp>
       <p:sp>
         <p:nvSpPr>
-          <p:cNvPr id="13" name="Rectangle 12">
-            <a:extLst>
-              <a:ext uri="{FF2B5EF4-FFF2-40B4-BE49-F238E27FC236}">
-                <a16:creationId xmlns:a16="http://schemas.microsoft.com/office/drawing/2014/main" id="{5EFB816A-0B0E-E2A6-F8DA-830371154B29}"/>
+          <p:cNvPr id="14" name="Rectangle 13">
+            <a:extLst>
+              <a:ext uri="{FF2B5EF4-FFF2-40B4-BE49-F238E27FC236}">
+                <a16:creationId xmlns:a16="http://schemas.microsoft.com/office/drawing/2014/main" id="{D0C3835B-1A74-A86B-6F9D-FC837D507D38}"/>
               </a:ext>
             </a:extLst>
           </p:cNvPr>
@@ -4722,60 +4722,8 @@
         </p:nvSpPr>
         <p:spPr>
           <a:xfrm>
-            <a:off x="10840081" y="2561586"/>
-            <a:ext cx="277275" cy="658193"/>
-          </a:xfrm>
-          <a:prstGeom prst="rect">
-            <a:avLst/>
-          </a:prstGeom>
-          <a:noFill/>
-          <a:ln w="28575">
-            <a:solidFill>
-              <a:srgbClr val="FF0000"/>
-            </a:solidFill>
-          </a:ln>
-        </p:spPr>
-        <p:style>
-          <a:lnRef idx="2">
-            <a:schemeClr val="accent1">
-              <a:shade val="50000"/>
-            </a:schemeClr>
-          </a:lnRef>
-          <a:fillRef idx="1">
-            <a:schemeClr val="accent1"/>
-          </a:fillRef>
-          <a:effectRef idx="0">
-            <a:schemeClr val="accent1"/>
-          </a:effectRef>
-          <a:fontRef idx="minor">
-            <a:schemeClr val="lt1"/>
-          </a:fontRef>
-        </p:style>
-        <p:txBody>
-          <a:bodyPr rtlCol="0" anchor="ctr"/>
-          <a:lstStyle/>
-          <a:p>
-            <a:pPr algn="ctr"/>
-            <a:endParaRPr lang="en-US"/>
-          </a:p>
-        </p:txBody>
-      </p:sp>
-      <p:sp>
-        <p:nvSpPr>
-          <p:cNvPr id="14" name="Rectangle 13">
-            <a:extLst>
-              <a:ext uri="{FF2B5EF4-FFF2-40B4-BE49-F238E27FC236}">
-                <a16:creationId xmlns:a16="http://schemas.microsoft.com/office/drawing/2014/main" id="{D0C3835B-1A74-A86B-6F9D-FC837D507D38}"/>
-              </a:ext>
-            </a:extLst>
-          </p:cNvPr>
-          <p:cNvSpPr/>
-          <p:nvPr/>
-        </p:nvSpPr>
-        <p:spPr>
-          <a:xfrm>
-            <a:off x="11022970" y="3966352"/>
-            <a:ext cx="277275" cy="658193"/>
+            <a:off x="11022970" y="4353402"/>
+            <a:ext cx="211779" cy="271143"/>
           </a:xfrm>
           <a:prstGeom prst="rect">
             <a:avLst/>
@@ -4969,6 +4917,187 @@
               <a:rPr lang="en-US" dirty="0"/>
               <a:t>TX Buffer</a:t>
             </a:r>
+          </a:p>
+        </p:txBody>
+      </p:sp>
+      <p:pic>
+        <p:nvPicPr>
+          <p:cNvPr id="1026" name="Picture 2" descr="IconExperience » G-Collection » Wifi Icon">
+            <a:extLst>
+              <a:ext uri="{FF2B5EF4-FFF2-40B4-BE49-F238E27FC236}">
+                <a16:creationId xmlns:a16="http://schemas.microsoft.com/office/drawing/2014/main" id="{FAB1CC68-8591-7E0B-359F-E12BE47A2055}"/>
+              </a:ext>
+            </a:extLst>
+          </p:cNvPr>
+          <p:cNvPicPr>
+            <a:picLocks noChangeAspect="1" noChangeArrowheads="1"/>
+          </p:cNvPicPr>
+          <p:nvPr/>
+        </p:nvPicPr>
+        <p:blipFill>
+          <a:blip r:embed="rId6">
+            <a:extLst>
+              <a:ext uri="{28A0092B-C50C-407E-A947-70E740481C1C}">
+                <a14:useLocalDpi xmlns:a14="http://schemas.microsoft.com/office/drawing/2010/main" val="0"/>
+              </a:ext>
+            </a:extLst>
+          </a:blip>
+          <a:srcRect/>
+          <a:stretch>
+            <a:fillRect/>
+          </a:stretch>
+        </p:blipFill>
+        <p:spPr bwMode="auto">
+          <a:xfrm rot="10958953">
+            <a:off x="10601704" y="2842765"/>
+            <a:ext cx="754028" cy="754028"/>
+          </a:xfrm>
+          <a:prstGeom prst="rect">
+            <a:avLst/>
+          </a:prstGeom>
+          <a:noFill/>
+          <a:extLst>
+            <a:ext uri="{909E8E84-426E-40DD-AFC4-6F175D3DCCD1}">
+              <a14:hiddenFill xmlns:a14="http://schemas.microsoft.com/office/drawing/2010/main">
+                <a:solidFill>
+                  <a:srgbClr val="FFFFFF"/>
+                </a:solidFill>
+              </a14:hiddenFill>
+            </a:ext>
+          </a:extLst>
+        </p:spPr>
+      </p:pic>
+      <p:sp>
+        <p:nvSpPr>
+          <p:cNvPr id="7" name="TextBox 6">
+            <a:extLst>
+              <a:ext uri="{FF2B5EF4-FFF2-40B4-BE49-F238E27FC236}">
+                <a16:creationId xmlns:a16="http://schemas.microsoft.com/office/drawing/2014/main" id="{F4E8E996-9C4E-7379-0137-B9664173C1FE}"/>
+              </a:ext>
+            </a:extLst>
+          </p:cNvPr>
+          <p:cNvSpPr txBox="1"/>
+          <p:nvPr/>
+        </p:nvSpPr>
+        <p:spPr>
+          <a:xfrm>
+            <a:off x="10965982" y="4020487"/>
+            <a:ext cx="429926" cy="369332"/>
+          </a:xfrm>
+          <a:prstGeom prst="rect">
+            <a:avLst/>
+          </a:prstGeom>
+          <a:noFill/>
+        </p:spPr>
+        <p:txBody>
+          <a:bodyPr wrap="none" rtlCol="0">
+            <a:spAutoFit/>
+          </a:bodyPr>
+          <a:lstStyle/>
+          <a:p>
+            <a:r>
+              <a:rPr lang="en-US" dirty="0">
+                <a:solidFill>
+                  <a:schemeClr val="accent1">
+                    <a:lumMod val="75000"/>
+                  </a:schemeClr>
+                </a:solidFill>
+              </a:rPr>
+              <a:t>RX</a:t>
+            </a:r>
+          </a:p>
+        </p:txBody>
+      </p:sp>
+      <p:sp>
+        <p:nvSpPr>
+          <p:cNvPr id="9" name="TextBox 8">
+            <a:extLst>
+              <a:ext uri="{FF2B5EF4-FFF2-40B4-BE49-F238E27FC236}">
+                <a16:creationId xmlns:a16="http://schemas.microsoft.com/office/drawing/2014/main" id="{B1A41A94-4543-053D-5BA9-8A219C4106EA}"/>
+              </a:ext>
+            </a:extLst>
+          </p:cNvPr>
+          <p:cNvSpPr txBox="1"/>
+          <p:nvPr/>
+        </p:nvSpPr>
+        <p:spPr>
+          <a:xfrm>
+            <a:off x="11064105" y="2782540"/>
+            <a:ext cx="417102" cy="369332"/>
+          </a:xfrm>
+          <a:prstGeom prst="rect">
+            <a:avLst/>
+          </a:prstGeom>
+          <a:noFill/>
+        </p:spPr>
+        <p:txBody>
+          <a:bodyPr wrap="none" rtlCol="0">
+            <a:spAutoFit/>
+          </a:bodyPr>
+          <a:lstStyle/>
+          <a:p>
+            <a:r>
+              <a:rPr lang="en-US" dirty="0">
+                <a:solidFill>
+                  <a:schemeClr val="accent1">
+                    <a:lumMod val="75000"/>
+                  </a:schemeClr>
+                </a:solidFill>
+              </a:rPr>
+              <a:t>TX</a:t>
+            </a:r>
+          </a:p>
+        </p:txBody>
+      </p:sp>
+      <p:sp>
+        <p:nvSpPr>
+          <p:cNvPr id="15" name="Rectangle 14">
+            <a:extLst>
+              <a:ext uri="{FF2B5EF4-FFF2-40B4-BE49-F238E27FC236}">
+                <a16:creationId xmlns:a16="http://schemas.microsoft.com/office/drawing/2014/main" id="{C2F89AF1-A034-37D5-066B-D20ACA534860}"/>
+              </a:ext>
+            </a:extLst>
+          </p:cNvPr>
+          <p:cNvSpPr/>
+          <p:nvPr/>
+        </p:nvSpPr>
+        <p:spPr>
+          <a:xfrm>
+            <a:off x="10900471" y="2658142"/>
+            <a:ext cx="211779" cy="271143"/>
+          </a:xfrm>
+          <a:prstGeom prst="rect">
+            <a:avLst/>
+          </a:prstGeom>
+          <a:noFill/>
+          <a:ln w="28575">
+            <a:solidFill>
+              <a:srgbClr val="FF0000"/>
+            </a:solidFill>
+          </a:ln>
+        </p:spPr>
+        <p:style>
+          <a:lnRef idx="2">
+            <a:schemeClr val="accent1">
+              <a:shade val="50000"/>
+            </a:schemeClr>
+          </a:lnRef>
+          <a:fillRef idx="1">
+            <a:schemeClr val="accent1"/>
+          </a:fillRef>
+          <a:effectRef idx="0">
+            <a:schemeClr val="accent1"/>
+          </a:effectRef>
+          <a:fontRef idx="minor">
+            <a:schemeClr val="lt1"/>
+          </a:fontRef>
+        </p:style>
+        <p:txBody>
+          <a:bodyPr rtlCol="0" anchor="ctr"/>
+          <a:lstStyle/>
+          <a:p>
+            <a:pPr algn="ctr"/>
+            <a:endParaRPr lang="en-US"/>
           </a:p>
         </p:txBody>
       </p:sp>
@@ -6110,60 +6239,11 @@
             <a:r>
               <a:rPr lang="en-US" dirty="0">
                 <a:solidFill>
-                  <a:schemeClr val="accent1">
-                    <a:lumMod val="60000"/>
-                    <a:lumOff val="40000"/>
-                  </a:schemeClr>
+                  <a:schemeClr val="tx1"/>
                 </a:solidFill>
               </a:rPr>
-              <a:t>Loopback</a:t>
-            </a:r>
-          </a:p>
-          <a:p>
-            <a:pPr lvl="1"/>
-            <a:r>
-              <a:rPr lang="en-US" dirty="0"/>
-              <a:t>Use for debugging only</a:t>
-            </a:r>
-          </a:p>
-          <a:p>
-            <a:pPr lvl="1"/>
-            <a:r>
-              <a:rPr lang="en-US" dirty="0"/>
-              <a:t>Do not submit</a:t>
-            </a:r>
-          </a:p>
-          <a:p>
-            <a:r>
-              <a:rPr lang="en-US" dirty="0">
-                <a:solidFill>
-                  <a:schemeClr val="accent1">
-                    <a:lumMod val="60000"/>
-                    <a:lumOff val="40000"/>
-                  </a:schemeClr>
-                </a:solidFill>
-              </a:rPr>
-              <a:t>One host, two </a:t>
-            </a:r>
-            <a:r>
-              <a:rPr lang="en-US" dirty="0" err="1">
-                <a:solidFill>
-                  <a:schemeClr val="accent1">
-                    <a:lumMod val="60000"/>
-                    <a:lumOff val="40000"/>
-                  </a:schemeClr>
-                </a:solidFill>
-              </a:rPr>
-              <a:t>Plutos</a:t>
-            </a:r>
-            <a:endParaRPr lang="en-US" dirty="0">
-              <a:solidFill>
-                <a:schemeClr val="accent1">
-                  <a:lumMod val="60000"/>
-                  <a:lumOff val="40000"/>
-                </a:schemeClr>
-              </a:solidFill>
-            </a:endParaRPr>
+              <a:t>Use two Pluto devices</a:t>
+            </a:r>
           </a:p>
           <a:p>
             <a:pPr lvl="1"/>
@@ -6173,31 +6253,7 @@
                   <a:schemeClr val="tx1"/>
                 </a:solidFill>
               </a:rPr>
-              <a:t>Allowed for submission</a:t>
-            </a:r>
-          </a:p>
-          <a:p>
-            <a:r>
-              <a:rPr lang="en-US" dirty="0">
-                <a:solidFill>
-                  <a:schemeClr val="accent1">
-                    <a:lumMod val="60000"/>
-                    <a:lumOff val="40000"/>
-                  </a:schemeClr>
-                </a:solidFill>
-              </a:rPr>
-              <a:t>Two hosts, one Pluto each</a:t>
-            </a:r>
-          </a:p>
-          <a:p>
-            <a:pPr lvl="1"/>
-            <a:r>
-              <a:rPr lang="en-US" dirty="0">
-                <a:solidFill>
-                  <a:schemeClr val="tx1"/>
-                </a:solidFill>
-              </a:rPr>
-              <a:t>Allowed for submission</a:t>
+              <a:t>Single or two hosts</a:t>
             </a:r>
           </a:p>
           <a:p>
@@ -7059,6 +7115,147 @@
           <a:xfrm>
             <a:off x="10512567" y="4483455"/>
             <a:ext cx="1543050" cy="1352550"/>
+          </a:xfrm>
+          <a:prstGeom prst="rect">
+            <a:avLst/>
+          </a:prstGeom>
+          <a:noFill/>
+          <a:extLst>
+            <a:ext uri="{909E8E84-426E-40DD-AFC4-6F175D3DCCD1}">
+              <a14:hiddenFill xmlns:a14="http://schemas.microsoft.com/office/drawing/2010/main">
+                <a:solidFill>
+                  <a:srgbClr val="FFFFFF"/>
+                </a:solidFill>
+              </a14:hiddenFill>
+            </a:ext>
+          </a:extLst>
+        </p:spPr>
+      </p:pic>
+      <p:pic>
+        <p:nvPicPr>
+          <p:cNvPr id="2050" name="Picture 2" descr="Green checkmark icon - Free green check mark icons">
+            <a:extLst>
+              <a:ext uri="{FF2B5EF4-FFF2-40B4-BE49-F238E27FC236}">
+                <a16:creationId xmlns:a16="http://schemas.microsoft.com/office/drawing/2014/main" id="{4E82CE79-6F8B-8CDF-9278-7FDF42FC3063}"/>
+              </a:ext>
+            </a:extLst>
+          </p:cNvPr>
+          <p:cNvPicPr>
+            <a:picLocks noChangeAspect="1" noChangeArrowheads="1"/>
+          </p:cNvPicPr>
+          <p:nvPr/>
+        </p:nvPicPr>
+        <p:blipFill>
+          <a:blip r:embed="rId5">
+            <a:extLst>
+              <a:ext uri="{28A0092B-C50C-407E-A947-70E740481C1C}">
+                <a14:useLocalDpi xmlns:a14="http://schemas.microsoft.com/office/drawing/2010/main" val="0"/>
+              </a:ext>
+            </a:extLst>
+          </a:blip>
+          <a:srcRect/>
+          <a:stretch>
+            <a:fillRect/>
+          </a:stretch>
+        </p:blipFill>
+        <p:spPr bwMode="auto">
+          <a:xfrm>
+            <a:off x="5092948" y="3185257"/>
+            <a:ext cx="679732" cy="679732"/>
+          </a:xfrm>
+          <a:prstGeom prst="rect">
+            <a:avLst/>
+          </a:prstGeom>
+          <a:noFill/>
+          <a:extLst>
+            <a:ext uri="{909E8E84-426E-40DD-AFC4-6F175D3DCCD1}">
+              <a14:hiddenFill xmlns:a14="http://schemas.microsoft.com/office/drawing/2010/main">
+                <a:solidFill>
+                  <a:srgbClr val="FFFFFF"/>
+                </a:solidFill>
+              </a14:hiddenFill>
+            </a:ext>
+          </a:extLst>
+        </p:spPr>
+      </p:pic>
+      <p:pic>
+        <p:nvPicPr>
+          <p:cNvPr id="9" name="Picture 2" descr="Green checkmark icon - Free green check mark icons">
+            <a:extLst>
+              <a:ext uri="{FF2B5EF4-FFF2-40B4-BE49-F238E27FC236}">
+                <a16:creationId xmlns:a16="http://schemas.microsoft.com/office/drawing/2014/main" id="{B59319AF-9881-47EF-1EED-0879E001090E}"/>
+              </a:ext>
+            </a:extLst>
+          </p:cNvPr>
+          <p:cNvPicPr>
+            <a:picLocks noChangeAspect="1" noChangeArrowheads="1"/>
+          </p:cNvPicPr>
+          <p:nvPr/>
+        </p:nvPicPr>
+        <p:blipFill>
+          <a:blip r:embed="rId5">
+            <a:extLst>
+              <a:ext uri="{28A0092B-C50C-407E-A947-70E740481C1C}">
+                <a14:useLocalDpi xmlns:a14="http://schemas.microsoft.com/office/drawing/2010/main" val="0"/>
+              </a:ext>
+            </a:extLst>
+          </a:blip>
+          <a:srcRect/>
+          <a:stretch>
+            <a:fillRect/>
+          </a:stretch>
+        </p:blipFill>
+        <p:spPr bwMode="auto">
+          <a:xfrm>
+            <a:off x="5090672" y="4704538"/>
+            <a:ext cx="679732" cy="679732"/>
+          </a:xfrm>
+          <a:prstGeom prst="rect">
+            <a:avLst/>
+          </a:prstGeom>
+          <a:noFill/>
+          <a:extLst>
+            <a:ext uri="{909E8E84-426E-40DD-AFC4-6F175D3DCCD1}">
+              <a14:hiddenFill xmlns:a14="http://schemas.microsoft.com/office/drawing/2010/main">
+                <a:solidFill>
+                  <a:srgbClr val="FFFFFF"/>
+                </a:solidFill>
+              </a14:hiddenFill>
+            </a:ext>
+          </a:extLst>
+        </p:spPr>
+      </p:pic>
+      <p:pic>
+        <p:nvPicPr>
+          <p:cNvPr id="2052" name="Picture 4" descr="79,160 Red Cross Symbol Stock Photos and Images - 123RF">
+            <a:extLst>
+              <a:ext uri="{FF2B5EF4-FFF2-40B4-BE49-F238E27FC236}">
+                <a16:creationId xmlns:a16="http://schemas.microsoft.com/office/drawing/2014/main" id="{7DD8C5E6-186A-FE58-F798-009904F9D3CC}"/>
+              </a:ext>
+            </a:extLst>
+          </p:cNvPr>
+          <p:cNvPicPr>
+            <a:picLocks noChangeAspect="1" noChangeArrowheads="1"/>
+          </p:cNvPicPr>
+          <p:nvPr/>
+        </p:nvPicPr>
+        <p:blipFill>
+          <a:blip r:embed="rId6">
+            <a:extLst>
+              <a:ext uri="{28A0092B-C50C-407E-A947-70E740481C1C}">
+                <a14:useLocalDpi xmlns:a14="http://schemas.microsoft.com/office/drawing/2010/main" val="0"/>
+              </a:ext>
+            </a:extLst>
+          </a:blip>
+          <a:srcRect/>
+          <a:stretch>
+            <a:fillRect/>
+          </a:stretch>
+        </p:blipFill>
+        <p:spPr bwMode="auto">
+          <a:xfrm>
+            <a:off x="4695417" y="1657740"/>
+            <a:ext cx="1071562" cy="1071562"/>
           </a:xfrm>
           <a:prstGeom prst="rect">
             <a:avLst/>
@@ -7718,7 +7915,7 @@
             <a:pPr lvl="1"/>
             <a:r>
               <a:rPr lang="en-US" dirty="0"/>
-              <a:t>Implemented in programmable components (FPGA, DSPs, Host PC)</a:t>
+              <a:t>Implemented in programmable components (FPGA, ARM, Host PC)</a:t>
             </a:r>
           </a:p>
           <a:p>
@@ -9061,7 +9258,7 @@
           <p:cNvPr id="2" name="Title 1">
             <a:extLst>
               <a:ext uri="{FF2B5EF4-FFF2-40B4-BE49-F238E27FC236}">
-                <a16:creationId xmlns:a16="http://schemas.microsoft.com/office/drawing/2014/main" id="{9C68035D-F741-8FD9-0AE7-8B01595985B1}"/>
+                <a16:creationId xmlns:a16="http://schemas.microsoft.com/office/drawing/2014/main" id="{3E445EDA-AD73-1507-A962-5755D39C2166}"/>
               </a:ext>
             </a:extLst>
           </p:cNvPr>
@@ -9074,13 +9271,129 @@
         </p:nvSpPr>
         <p:spPr/>
         <p:txBody>
+          <a:bodyPr>
+            <a:normAutofit/>
+          </a:bodyPr>
+          <a:lstStyle/>
+          <a:p>
+            <a:r>
+              <a:rPr lang="en-US" dirty="0"/>
+              <a:t>The 9361 Integrated Circuit</a:t>
+            </a:r>
+          </a:p>
+        </p:txBody>
+      </p:sp>
+      <p:sp>
+        <p:nvSpPr>
+          <p:cNvPr id="3" name="Content Placeholder 2">
+            <a:extLst>
+              <a:ext uri="{FF2B5EF4-FFF2-40B4-BE49-F238E27FC236}">
+                <a16:creationId xmlns:a16="http://schemas.microsoft.com/office/drawing/2014/main" id="{36A7DD3E-DA01-BC1A-4FCD-F64A38605640}"/>
+              </a:ext>
+            </a:extLst>
+          </p:cNvPr>
+          <p:cNvSpPr>
+            <a:spLocks noGrp="1"/>
+          </p:cNvSpPr>
+          <p:nvPr>
+            <p:ph idx="1"/>
+          </p:nvPr>
+        </p:nvSpPr>
+        <p:spPr>
+          <a:xfrm>
+            <a:off x="7180521" y="1655632"/>
+            <a:ext cx="4541018" cy="4329817"/>
+          </a:xfrm>
+        </p:spPr>
+        <p:txBody>
           <a:bodyPr/>
           <a:lstStyle/>
           <a:p>
             <a:r>
               <a:rPr lang="en-US" dirty="0"/>
-              <a:t>The 9361 Integrated Circuit</a:t>
-            </a:r>
+              <a:t>Analog Devices AD9361 Wideband TXCR</a:t>
+            </a:r>
+          </a:p>
+          <a:p>
+            <a:pPr lvl="1"/>
+            <a:r>
+              <a:rPr lang="en-US" dirty="0"/>
+              <a:t>Single integrated circuit</a:t>
+            </a:r>
+          </a:p>
+          <a:p>
+            <a:r>
+              <a:rPr lang="en-US" dirty="0">
+                <a:solidFill>
+                  <a:schemeClr val="accent2">
+                    <a:lumMod val="75000"/>
+                  </a:schemeClr>
+                </a:solidFill>
+              </a:rPr>
+              <a:t>Receiver (RX)</a:t>
+            </a:r>
+            <a:r>
+              <a:rPr lang="en-US" dirty="0"/>
+              <a:t>:</a:t>
+            </a:r>
+          </a:p>
+          <a:p>
+            <a:pPr lvl="1"/>
+            <a:r>
+              <a:rPr lang="en-US" dirty="0"/>
+              <a:t>Low noise amplifier (LNA)</a:t>
+            </a:r>
+          </a:p>
+          <a:p>
+            <a:pPr lvl="1"/>
+            <a:r>
+              <a:rPr lang="en-US" dirty="0"/>
+              <a:t>Then tunable mixer, ADC, Filters</a:t>
+            </a:r>
+          </a:p>
+          <a:p>
+            <a:pPr lvl="1"/>
+            <a:endParaRPr lang="en-US" dirty="0"/>
+          </a:p>
+          <a:p>
+            <a:r>
+              <a:rPr lang="en-US" dirty="0">
+                <a:solidFill>
+                  <a:schemeClr val="accent5">
+                    <a:lumMod val="75000"/>
+                  </a:schemeClr>
+                </a:solidFill>
+              </a:rPr>
+              <a:t>Transmitter (TX</a:t>
+            </a:r>
+            <a:r>
+              <a:rPr lang="en-US" dirty="0">
+                <a:solidFill>
+                  <a:schemeClr val="accent2">
+                    <a:lumMod val="75000"/>
+                  </a:schemeClr>
+                </a:solidFill>
+              </a:rPr>
+              <a:t>):</a:t>
+            </a:r>
+          </a:p>
+          <a:p>
+            <a:pPr lvl="1"/>
+            <a:r>
+              <a:rPr lang="en-US" dirty="0"/>
+              <a:t>Filters, DAC, tunable mixer</a:t>
+            </a:r>
+          </a:p>
+          <a:p>
+            <a:pPr lvl="1"/>
+            <a:r>
+              <a:rPr lang="en-US" dirty="0"/>
+              <a:t>Power amplifier (PA)</a:t>
+            </a:r>
+          </a:p>
+          <a:p>
+            <a:pPr lvl="1"/>
+            <a:endParaRPr lang="en-US" dirty="0"/>
           </a:p>
         </p:txBody>
       </p:sp>
@@ -9089,7 +9402,7 @@
           <p:cNvPr id="4" name="Slide Number Placeholder 3">
             <a:extLst>
               <a:ext uri="{FF2B5EF4-FFF2-40B4-BE49-F238E27FC236}">
-                <a16:creationId xmlns:a16="http://schemas.microsoft.com/office/drawing/2014/main" id="{A1062547-5A2C-FBA8-FFC3-670D60116E6F}"/>
+                <a16:creationId xmlns:a16="http://schemas.microsoft.com/office/drawing/2014/main" id="{D3D97429-99D6-72F2-D52C-B19349E44670}"/>
               </a:ext>
             </a:extLst>
           </p:cNvPr>
@@ -9115,10 +9428,10 @@
       </p:sp>
       <p:pic>
         <p:nvPicPr>
-          <p:cNvPr id="6" name="Picture 5">
-            <a:extLst>
-              <a:ext uri="{FF2B5EF4-FFF2-40B4-BE49-F238E27FC236}">
-                <a16:creationId xmlns:a16="http://schemas.microsoft.com/office/drawing/2014/main" id="{C0F79D95-61EC-E572-6CE1-9D2237FB13C4}"/>
+          <p:cNvPr id="5" name="Picture 4">
+            <a:extLst>
+              <a:ext uri="{FF2B5EF4-FFF2-40B4-BE49-F238E27FC236}">
+                <a16:creationId xmlns:a16="http://schemas.microsoft.com/office/drawing/2014/main" id="{5261B581-E83F-945E-0ED4-56EA213B2058}"/>
               </a:ext>
             </a:extLst>
           </p:cNvPr>
@@ -9135,8 +9448,8 @@
         </p:blipFill>
         <p:spPr>
           <a:xfrm>
-            <a:off x="997162" y="1523908"/>
-            <a:ext cx="6113128" cy="4438902"/>
+            <a:off x="1097280" y="1854164"/>
+            <a:ext cx="4748401" cy="3447938"/>
           </a:xfrm>
           <a:prstGeom prst="rect">
             <a:avLst/>
@@ -9145,73 +9458,477 @@
       </p:pic>
       <p:sp>
         <p:nvSpPr>
-          <p:cNvPr id="9" name="Content Placeholder 2">
-            <a:extLst>
-              <a:ext uri="{FF2B5EF4-FFF2-40B4-BE49-F238E27FC236}">
-                <a16:creationId xmlns:a16="http://schemas.microsoft.com/office/drawing/2014/main" id="{04235080-99D7-2D92-4C9A-CE1B8CBC9B4E}"/>
-              </a:ext>
-            </a:extLst>
-          </p:cNvPr>
-          <p:cNvSpPr>
-            <a:spLocks noGrp="1"/>
-          </p:cNvSpPr>
-          <p:nvPr>
-            <p:ph idx="1"/>
-          </p:nvPr>
-        </p:nvSpPr>
-        <p:spPr>
-          <a:xfrm>
-            <a:off x="7110290" y="1663912"/>
-            <a:ext cx="4772425" cy="3670180"/>
-          </a:xfrm>
-        </p:spPr>
-        <p:txBody>
-          <a:bodyPr>
-            <a:normAutofit/>
+          <p:cNvPr id="7" name="Rectangle: Rounded Corners 6">
+            <a:extLst>
+              <a:ext uri="{FF2B5EF4-FFF2-40B4-BE49-F238E27FC236}">
+                <a16:creationId xmlns:a16="http://schemas.microsoft.com/office/drawing/2014/main" id="{4EB8BF3D-833F-880C-1B6F-A25FC95A116D}"/>
+              </a:ext>
+            </a:extLst>
+          </p:cNvPr>
+          <p:cNvSpPr/>
+          <p:nvPr/>
+        </p:nvSpPr>
+        <p:spPr>
+          <a:xfrm>
+            <a:off x="1229075" y="1950395"/>
+            <a:ext cx="4638696" cy="1378849"/>
+          </a:xfrm>
+          <a:prstGeom prst="roundRect">
+            <a:avLst/>
+          </a:prstGeom>
+          <a:noFill/>
+          <a:ln w="31750">
+            <a:solidFill>
+              <a:schemeClr val="accent2">
+                <a:lumMod val="75000"/>
+              </a:schemeClr>
+            </a:solidFill>
+          </a:ln>
+        </p:spPr>
+        <p:style>
+          <a:lnRef idx="2">
+            <a:schemeClr val="accent1">
+              <a:shade val="50000"/>
+            </a:schemeClr>
+          </a:lnRef>
+          <a:fillRef idx="1">
+            <a:schemeClr val="accent1"/>
+          </a:fillRef>
+          <a:effectRef idx="0">
+            <a:schemeClr val="accent1"/>
+          </a:effectRef>
+          <a:fontRef idx="minor">
+            <a:schemeClr val="lt1"/>
+          </a:fontRef>
+        </p:style>
+        <p:txBody>
+          <a:bodyPr rtlCol="0" anchor="ctr"/>
+          <a:lstStyle/>
+          <a:p>
+            <a:pPr algn="ctr"/>
+            <a:endParaRPr lang="en-US"/>
+          </a:p>
+        </p:txBody>
+      </p:sp>
+      <p:sp>
+        <p:nvSpPr>
+          <p:cNvPr id="9" name="Rectangle: Rounded Corners 8">
+            <a:extLst>
+              <a:ext uri="{FF2B5EF4-FFF2-40B4-BE49-F238E27FC236}">
+                <a16:creationId xmlns:a16="http://schemas.microsoft.com/office/drawing/2014/main" id="{97A1ED37-2D3E-9366-2C43-0BD081D74408}"/>
+              </a:ext>
+            </a:extLst>
+          </p:cNvPr>
+          <p:cNvSpPr/>
+          <p:nvPr/>
+        </p:nvSpPr>
+        <p:spPr>
+          <a:xfrm>
+            <a:off x="1136554" y="4007279"/>
+            <a:ext cx="4748402" cy="1268684"/>
+          </a:xfrm>
+          <a:prstGeom prst="roundRect">
+            <a:avLst/>
+          </a:prstGeom>
+          <a:noFill/>
+          <a:ln w="31750">
+            <a:solidFill>
+              <a:schemeClr val="accent6">
+                <a:lumMod val="75000"/>
+              </a:schemeClr>
+            </a:solidFill>
+          </a:ln>
+        </p:spPr>
+        <p:style>
+          <a:lnRef idx="2">
+            <a:schemeClr val="accent1">
+              <a:shade val="50000"/>
+            </a:schemeClr>
+          </a:lnRef>
+          <a:fillRef idx="1">
+            <a:schemeClr val="accent1"/>
+          </a:fillRef>
+          <a:effectRef idx="0">
+            <a:schemeClr val="accent1"/>
+          </a:effectRef>
+          <a:fontRef idx="minor">
+            <a:schemeClr val="lt1"/>
+          </a:fontRef>
+        </p:style>
+        <p:txBody>
+          <a:bodyPr rtlCol="0" anchor="ctr"/>
+          <a:lstStyle/>
+          <a:p>
+            <a:pPr algn="ctr"/>
+            <a:endParaRPr lang="en-US"/>
+          </a:p>
+        </p:txBody>
+      </p:sp>
+      <p:sp>
+        <p:nvSpPr>
+          <p:cNvPr id="10" name="TextBox 9">
+            <a:extLst>
+              <a:ext uri="{FF2B5EF4-FFF2-40B4-BE49-F238E27FC236}">
+                <a16:creationId xmlns:a16="http://schemas.microsoft.com/office/drawing/2014/main" id="{EDD3EB5F-1AB5-1572-D306-8F72BBEDDD19}"/>
+              </a:ext>
+            </a:extLst>
+          </p:cNvPr>
+          <p:cNvSpPr txBox="1"/>
+          <p:nvPr/>
+        </p:nvSpPr>
+        <p:spPr>
+          <a:xfrm>
+            <a:off x="3333460" y="1554924"/>
+            <a:ext cx="429926" cy="369332"/>
+          </a:xfrm>
+          <a:prstGeom prst="rect">
+            <a:avLst/>
+          </a:prstGeom>
+          <a:noFill/>
+        </p:spPr>
+        <p:txBody>
+          <a:bodyPr wrap="none" rtlCol="0">
+            <a:spAutoFit/>
           </a:bodyPr>
           <a:lstStyle/>
           <a:p>
             <a:r>
-              <a:rPr lang="en-US" dirty="0"/>
-              <a:t>Transmitter:</a:t>
-            </a:r>
-          </a:p>
-          <a:p>
-            <a:pPr lvl="1"/>
-            <a:r>
-              <a:rPr lang="en-US" dirty="0" err="1"/>
-              <a:t>Upconversion</a:t>
-            </a:r>
-            <a:endParaRPr lang="en-US" dirty="0"/>
-          </a:p>
-          <a:p>
-            <a:pPr lvl="1"/>
-            <a:r>
-              <a:rPr lang="en-US" dirty="0"/>
-              <a:t>ADC, Filtering, Power amplifier (PA)</a:t>
-            </a:r>
-          </a:p>
-          <a:p>
-            <a:endParaRPr lang="en-US" dirty="0"/>
-          </a:p>
-          <a:p>
-            <a:r>
-              <a:rPr lang="en-US" dirty="0"/>
-              <a:t>Receiver</a:t>
-            </a:r>
-          </a:p>
-          <a:p>
-            <a:pPr lvl="1"/>
-            <a:r>
-              <a:rPr lang="en-US" dirty="0"/>
-              <a:t>Low-noise amplifier (LNA)</a:t>
-            </a:r>
-          </a:p>
-          <a:p>
-            <a:pPr lvl="1"/>
-            <a:r>
-              <a:rPr lang="en-US" dirty="0"/>
-              <a:t>Down-conversion, DAC, Filtering</a:t>
+              <a:rPr lang="en-US" dirty="0">
+                <a:solidFill>
+                  <a:schemeClr val="accent1">
+                    <a:lumMod val="75000"/>
+                  </a:schemeClr>
+                </a:solidFill>
+              </a:rPr>
+              <a:t>RX</a:t>
+            </a:r>
+          </a:p>
+        </p:txBody>
+      </p:sp>
+      <p:sp>
+        <p:nvSpPr>
+          <p:cNvPr id="11" name="TextBox 10">
+            <a:extLst>
+              <a:ext uri="{FF2B5EF4-FFF2-40B4-BE49-F238E27FC236}">
+                <a16:creationId xmlns:a16="http://schemas.microsoft.com/office/drawing/2014/main" id="{93F74B59-088E-6BA6-C5C5-212737552CA3}"/>
+              </a:ext>
+            </a:extLst>
+          </p:cNvPr>
+          <p:cNvSpPr txBox="1"/>
+          <p:nvPr/>
+        </p:nvSpPr>
+        <p:spPr>
+          <a:xfrm>
+            <a:off x="3262929" y="5482359"/>
+            <a:ext cx="417102" cy="369332"/>
+          </a:xfrm>
+          <a:prstGeom prst="rect">
+            <a:avLst/>
+          </a:prstGeom>
+          <a:noFill/>
+        </p:spPr>
+        <p:txBody>
+          <a:bodyPr wrap="none" rtlCol="0">
+            <a:spAutoFit/>
+          </a:bodyPr>
+          <a:lstStyle/>
+          <a:p>
+            <a:r>
+              <a:rPr lang="en-US" dirty="0">
+                <a:solidFill>
+                  <a:schemeClr val="accent5">
+                    <a:lumMod val="75000"/>
+                  </a:schemeClr>
+                </a:solidFill>
+              </a:rPr>
+              <a:t>TX</a:t>
+            </a:r>
+          </a:p>
+        </p:txBody>
+      </p:sp>
+      <p:sp>
+        <p:nvSpPr>
+          <p:cNvPr id="8" name="Arrow: Right 7">
+            <a:extLst>
+              <a:ext uri="{FF2B5EF4-FFF2-40B4-BE49-F238E27FC236}">
+                <a16:creationId xmlns:a16="http://schemas.microsoft.com/office/drawing/2014/main" id="{11662CC6-89AA-BD43-AF27-969BCEA0124A}"/>
+              </a:ext>
+            </a:extLst>
+          </p:cNvPr>
+          <p:cNvSpPr/>
+          <p:nvPr/>
+        </p:nvSpPr>
+        <p:spPr>
+          <a:xfrm>
+            <a:off x="510577" y="2444840"/>
+            <a:ext cx="625976" cy="310063"/>
+          </a:xfrm>
+          <a:prstGeom prst="rightArrow">
+            <a:avLst/>
+          </a:prstGeom>
+        </p:spPr>
+        <p:style>
+          <a:lnRef idx="2">
+            <a:schemeClr val="accent1">
+              <a:shade val="50000"/>
+            </a:schemeClr>
+          </a:lnRef>
+          <a:fillRef idx="1">
+            <a:schemeClr val="accent1"/>
+          </a:fillRef>
+          <a:effectRef idx="0">
+            <a:schemeClr val="accent1"/>
+          </a:effectRef>
+          <a:fontRef idx="minor">
+            <a:schemeClr val="lt1"/>
+          </a:fontRef>
+        </p:style>
+        <p:txBody>
+          <a:bodyPr rtlCol="0" anchor="ctr"/>
+          <a:lstStyle/>
+          <a:p>
+            <a:pPr algn="ctr"/>
+            <a:endParaRPr lang="en-US"/>
+          </a:p>
+        </p:txBody>
+      </p:sp>
+      <p:sp>
+        <p:nvSpPr>
+          <p:cNvPr id="15" name="Arrow: Right 14">
+            <a:extLst>
+              <a:ext uri="{FF2B5EF4-FFF2-40B4-BE49-F238E27FC236}">
+                <a16:creationId xmlns:a16="http://schemas.microsoft.com/office/drawing/2014/main" id="{B4477539-C3DB-DF0D-7D1F-A57143011587}"/>
+              </a:ext>
+            </a:extLst>
+          </p:cNvPr>
+          <p:cNvSpPr/>
+          <p:nvPr/>
+        </p:nvSpPr>
+        <p:spPr>
+          <a:xfrm>
+            <a:off x="5938203" y="2444839"/>
+            <a:ext cx="625976" cy="310063"/>
+          </a:xfrm>
+          <a:prstGeom prst="rightArrow">
+            <a:avLst/>
+          </a:prstGeom>
+        </p:spPr>
+        <p:style>
+          <a:lnRef idx="2">
+            <a:schemeClr val="accent1">
+              <a:shade val="50000"/>
+            </a:schemeClr>
+          </a:lnRef>
+          <a:fillRef idx="1">
+            <a:schemeClr val="accent1"/>
+          </a:fillRef>
+          <a:effectRef idx="0">
+            <a:schemeClr val="accent1"/>
+          </a:effectRef>
+          <a:fontRef idx="minor">
+            <a:schemeClr val="lt1"/>
+          </a:fontRef>
+        </p:style>
+        <p:txBody>
+          <a:bodyPr rtlCol="0" anchor="ctr"/>
+          <a:lstStyle/>
+          <a:p>
+            <a:pPr algn="ctr"/>
+            <a:endParaRPr lang="en-US"/>
+          </a:p>
+        </p:txBody>
+      </p:sp>
+      <p:sp>
+        <p:nvSpPr>
+          <p:cNvPr id="16" name="Arrow: Right 15">
+            <a:extLst>
+              <a:ext uri="{FF2B5EF4-FFF2-40B4-BE49-F238E27FC236}">
+                <a16:creationId xmlns:a16="http://schemas.microsoft.com/office/drawing/2014/main" id="{25F22546-68A4-BFF7-E72A-A89926DDCADA}"/>
+              </a:ext>
+            </a:extLst>
+          </p:cNvPr>
+          <p:cNvSpPr/>
+          <p:nvPr/>
+        </p:nvSpPr>
+        <p:spPr>
+          <a:xfrm rot="10800000">
+            <a:off x="427052" y="4486589"/>
+            <a:ext cx="625976" cy="310063"/>
+          </a:xfrm>
+          <a:prstGeom prst="rightArrow">
+            <a:avLst/>
+          </a:prstGeom>
+          <a:solidFill>
+            <a:schemeClr val="accent5">
+              <a:lumMod val="40000"/>
+              <a:lumOff val="60000"/>
+            </a:schemeClr>
+          </a:solidFill>
+          <a:ln>
+            <a:solidFill>
+              <a:schemeClr val="accent5">
+                <a:lumMod val="75000"/>
+              </a:schemeClr>
+            </a:solidFill>
+          </a:ln>
+        </p:spPr>
+        <p:style>
+          <a:lnRef idx="2">
+            <a:schemeClr val="accent1">
+              <a:shade val="50000"/>
+            </a:schemeClr>
+          </a:lnRef>
+          <a:fillRef idx="1">
+            <a:schemeClr val="accent1"/>
+          </a:fillRef>
+          <a:effectRef idx="0">
+            <a:schemeClr val="accent1"/>
+          </a:effectRef>
+          <a:fontRef idx="minor">
+            <a:schemeClr val="lt1"/>
+          </a:fontRef>
+        </p:style>
+        <p:txBody>
+          <a:bodyPr rtlCol="0" anchor="ctr"/>
+          <a:lstStyle/>
+          <a:p>
+            <a:pPr algn="ctr"/>
+            <a:endParaRPr lang="en-US"/>
+          </a:p>
+        </p:txBody>
+      </p:sp>
+      <p:sp>
+        <p:nvSpPr>
+          <p:cNvPr id="17" name="Arrow: Right 16">
+            <a:extLst>
+              <a:ext uri="{FF2B5EF4-FFF2-40B4-BE49-F238E27FC236}">
+                <a16:creationId xmlns:a16="http://schemas.microsoft.com/office/drawing/2014/main" id="{80C7ECD8-6120-0D74-9892-C2D8F3143B0D}"/>
+              </a:ext>
+            </a:extLst>
+          </p:cNvPr>
+          <p:cNvSpPr/>
+          <p:nvPr/>
+        </p:nvSpPr>
+        <p:spPr>
+          <a:xfrm rot="10800000">
+            <a:off x="5970505" y="4498590"/>
+            <a:ext cx="625976" cy="310063"/>
+          </a:xfrm>
+          <a:prstGeom prst="rightArrow">
+            <a:avLst/>
+          </a:prstGeom>
+          <a:solidFill>
+            <a:schemeClr val="accent5">
+              <a:lumMod val="40000"/>
+              <a:lumOff val="60000"/>
+            </a:schemeClr>
+          </a:solidFill>
+          <a:ln>
+            <a:solidFill>
+              <a:schemeClr val="accent5">
+                <a:lumMod val="75000"/>
+              </a:schemeClr>
+            </a:solidFill>
+          </a:ln>
+        </p:spPr>
+        <p:style>
+          <a:lnRef idx="2">
+            <a:schemeClr val="accent1">
+              <a:shade val="50000"/>
+            </a:schemeClr>
+          </a:lnRef>
+          <a:fillRef idx="1">
+            <a:schemeClr val="accent1"/>
+          </a:fillRef>
+          <a:effectRef idx="0">
+            <a:schemeClr val="accent1"/>
+          </a:effectRef>
+          <a:fontRef idx="minor">
+            <a:schemeClr val="lt1"/>
+          </a:fontRef>
+        </p:style>
+        <p:txBody>
+          <a:bodyPr rtlCol="0" anchor="ctr"/>
+          <a:lstStyle/>
+          <a:p>
+            <a:pPr algn="ctr"/>
+            <a:endParaRPr lang="en-US"/>
+          </a:p>
+        </p:txBody>
+      </p:sp>
+      <p:sp>
+        <p:nvSpPr>
+          <p:cNvPr id="18" name="TextBox 17">
+            <a:extLst>
+              <a:ext uri="{FF2B5EF4-FFF2-40B4-BE49-F238E27FC236}">
+                <a16:creationId xmlns:a16="http://schemas.microsoft.com/office/drawing/2014/main" id="{4A2A9870-D028-41E9-349F-4AD6288A96B4}"/>
+              </a:ext>
+            </a:extLst>
+          </p:cNvPr>
+          <p:cNvSpPr txBox="1"/>
+          <p:nvPr/>
+        </p:nvSpPr>
+        <p:spPr>
+          <a:xfrm>
+            <a:off x="451907" y="3345579"/>
+            <a:ext cx="415498" cy="369332"/>
+          </a:xfrm>
+          <a:prstGeom prst="rect">
+            <a:avLst/>
+          </a:prstGeom>
+          <a:noFill/>
+        </p:spPr>
+        <p:txBody>
+          <a:bodyPr wrap="none" rtlCol="0">
+            <a:spAutoFit/>
+          </a:bodyPr>
+          <a:lstStyle/>
+          <a:p>
+            <a:r>
+              <a:rPr lang="en-US" i="1" dirty="0"/>
+              <a:t>RF</a:t>
+            </a:r>
+          </a:p>
+        </p:txBody>
+      </p:sp>
+      <p:sp>
+        <p:nvSpPr>
+          <p:cNvPr id="19" name="TextBox 18">
+            <a:extLst>
+              <a:ext uri="{FF2B5EF4-FFF2-40B4-BE49-F238E27FC236}">
+                <a16:creationId xmlns:a16="http://schemas.microsoft.com/office/drawing/2014/main" id="{084BFD12-3865-3775-B4A9-F9EC67877330}"/>
+              </a:ext>
+            </a:extLst>
+          </p:cNvPr>
+          <p:cNvSpPr txBox="1"/>
+          <p:nvPr/>
+        </p:nvSpPr>
+        <p:spPr>
+          <a:xfrm>
+            <a:off x="6013651" y="3105834"/>
+            <a:ext cx="797078" cy="646331"/>
+          </a:xfrm>
+          <a:prstGeom prst="rect">
+            <a:avLst/>
+          </a:prstGeom>
+          <a:noFill/>
+        </p:spPr>
+        <p:txBody>
+          <a:bodyPr wrap="none" rtlCol="0">
+            <a:spAutoFit/>
+          </a:bodyPr>
+          <a:lstStyle/>
+          <a:p>
+            <a:r>
+              <a:rPr lang="en-US" i="1" dirty="0"/>
+              <a:t>Digital</a:t>
+            </a:r>
+            <a:br>
+              <a:rPr lang="en-US" i="1" dirty="0"/>
+            </a:br>
+            <a:r>
+              <a:rPr lang="en-US" i="1" dirty="0"/>
+              <a:t>I/Q</a:t>
             </a:r>
           </a:p>
         </p:txBody>
@@ -9219,7 +9936,7 @@
     </p:spTree>
     <p:extLst>
       <p:ext uri="{BB962C8B-B14F-4D97-AF65-F5344CB8AC3E}">
-        <p14:creationId xmlns:p14="http://schemas.microsoft.com/office/powerpoint/2010/main" val="2272192180"/>
+        <p14:creationId xmlns:p14="http://schemas.microsoft.com/office/powerpoint/2010/main" val="3601892694"/>
       </p:ext>
     </p:extLst>
   </p:cSld>

</xml_diff>